<commit_message>
Correcting a spelling mistake in the PPT
</commit_message>
<xml_diff>
--- a/Mini_Project/Guhan_22410_Final_Submission/CORDIC_Demo_PPT.pptx
+++ b/Mini_Project/Guhan_22410_Final_Submission/CORDIC_Demo_PPT.pptx
@@ -221,7 +221,7 @@
           <a:p>
             <a:fld id="{E978604B-E605-49BB-8B28-A273CBED105A}" type="datetimeFigureOut">
               <a:rPr lang="en-US" smtClean="0"/>
-              <a:t>4/16/2024</a:t>
+              <a:t>4/18/2024</a:t>
             </a:fld>
             <a:endParaRPr lang="en-US"/>
           </a:p>
@@ -763,7 +763,7 @@
           <a:p>
             <a:fld id="{F1B5B1A4-F391-4A7B-9682-B459FA69E16A}" type="datetimeFigureOut">
               <a:rPr lang="en-IN" smtClean="0"/>
-              <a:t>16-04-2024</a:t>
+              <a:t>18-04-2024</a:t>
             </a:fld>
             <a:endParaRPr lang="en-IN"/>
           </a:p>
@@ -991,7 +991,7 @@
           <a:p>
             <a:fld id="{F1B5B1A4-F391-4A7B-9682-B459FA69E16A}" type="datetimeFigureOut">
               <a:rPr lang="en-IN" smtClean="0"/>
-              <a:t>16-04-2024</a:t>
+              <a:t>18-04-2024</a:t>
             </a:fld>
             <a:endParaRPr lang="en-IN"/>
           </a:p>
@@ -1171,7 +1171,7 @@
           <a:p>
             <a:fld id="{F1B5B1A4-F391-4A7B-9682-B459FA69E16A}" type="datetimeFigureOut">
               <a:rPr lang="en-IN" smtClean="0"/>
-              <a:t>16-04-2024</a:t>
+              <a:t>18-04-2024</a:t>
             </a:fld>
             <a:endParaRPr lang="en-IN"/>
           </a:p>
@@ -1341,7 +1341,7 @@
           <a:p>
             <a:fld id="{F1B5B1A4-F391-4A7B-9682-B459FA69E16A}" type="datetimeFigureOut">
               <a:rPr lang="en-IN" smtClean="0"/>
-              <a:t>16-04-2024</a:t>
+              <a:t>18-04-2024</a:t>
             </a:fld>
             <a:endParaRPr lang="en-IN"/>
           </a:p>
@@ -1595,7 +1595,7 @@
           <a:p>
             <a:fld id="{F1B5B1A4-F391-4A7B-9682-B459FA69E16A}" type="datetimeFigureOut">
               <a:rPr lang="en-IN" smtClean="0"/>
-              <a:t>16-04-2024</a:t>
+              <a:t>18-04-2024</a:t>
             </a:fld>
             <a:endParaRPr lang="en-IN"/>
           </a:p>
@@ -1921,7 +1921,7 @@
           <a:p>
             <a:fld id="{F1B5B1A4-F391-4A7B-9682-B459FA69E16A}" type="datetimeFigureOut">
               <a:rPr lang="en-IN" smtClean="0"/>
-              <a:t>16-04-2024</a:t>
+              <a:t>18-04-2024</a:t>
             </a:fld>
             <a:endParaRPr lang="en-IN"/>
           </a:p>
@@ -2372,7 +2372,7 @@
           <a:p>
             <a:fld id="{F1B5B1A4-F391-4A7B-9682-B459FA69E16A}" type="datetimeFigureOut">
               <a:rPr lang="en-IN" smtClean="0"/>
-              <a:t>16-04-2024</a:t>
+              <a:t>18-04-2024</a:t>
             </a:fld>
             <a:endParaRPr lang="en-IN"/>
           </a:p>
@@ -2490,7 +2490,7 @@
           <a:p>
             <a:fld id="{F1B5B1A4-F391-4A7B-9682-B459FA69E16A}" type="datetimeFigureOut">
               <a:rPr lang="en-IN" smtClean="0"/>
-              <a:t>16-04-2024</a:t>
+              <a:t>18-04-2024</a:t>
             </a:fld>
             <a:endParaRPr lang="en-IN"/>
           </a:p>
@@ -2585,7 +2585,7 @@
           <a:p>
             <a:fld id="{F1B5B1A4-F391-4A7B-9682-B459FA69E16A}" type="datetimeFigureOut">
               <a:rPr lang="en-IN" smtClean="0"/>
-              <a:t>16-04-2024</a:t>
+              <a:t>18-04-2024</a:t>
             </a:fld>
             <a:endParaRPr lang="en-IN"/>
           </a:p>
@@ -2872,7 +2872,7 @@
           <a:p>
             <a:fld id="{F1B5B1A4-F391-4A7B-9682-B459FA69E16A}" type="datetimeFigureOut">
               <a:rPr lang="en-IN" smtClean="0"/>
-              <a:t>16-04-2024</a:t>
+              <a:t>18-04-2024</a:t>
             </a:fld>
             <a:endParaRPr lang="en-IN"/>
           </a:p>
@@ -3194,7 +3194,7 @@
           <a:p>
             <a:fld id="{F1B5B1A4-F391-4A7B-9682-B459FA69E16A}" type="datetimeFigureOut">
               <a:rPr lang="en-IN" smtClean="0"/>
-              <a:t>16-04-2024</a:t>
+              <a:t>18-04-2024</a:t>
             </a:fld>
             <a:endParaRPr lang="en-IN"/>
           </a:p>
@@ -3448,7 +3448,7 @@
           <a:p>
             <a:fld id="{F1B5B1A4-F391-4A7B-9682-B459FA69E16A}" type="datetimeFigureOut">
               <a:rPr lang="en-IN" smtClean="0"/>
-              <a:t>16-04-2024</a:t>
+              <a:t>18-04-2024</a:t>
             </a:fld>
             <a:endParaRPr lang="en-IN"/>
           </a:p>
@@ -6053,8 +6053,8 @@
           <a:chExt cx="0" cy="0"/>
         </a:xfrm>
       </p:grpSpPr>
-      <mc:AlternateContent xmlns:mc="http://schemas.openxmlformats.org/markup-compatibility/2006">
-        <mc:Choice xmlns:a14="http://schemas.microsoft.com/office/drawing/2010/main" Requires="a14">
+      <mc:AlternateContent xmlns:mc="http://schemas.openxmlformats.org/markup-compatibility/2006" xmlns:a14="http://schemas.microsoft.com/office/drawing/2010/main">
+        <mc:Choice Requires="a14">
           <p:sp>
             <p:nvSpPr>
               <p:cNvPr id="2" name="Title 1">
@@ -6167,7 +6167,7 @@
             </p:txBody>
           </p:sp>
         </mc:Choice>
-        <mc:Fallback>
+        <mc:Fallback xmlns="">
           <p:sp>
             <p:nvSpPr>
               <p:cNvPr id="2" name="Title 1">
@@ -7081,8 +7081,8 @@
           <a:chExt cx="0" cy="0"/>
         </a:xfrm>
       </p:grpSpPr>
-      <mc:AlternateContent xmlns:mc="http://schemas.openxmlformats.org/markup-compatibility/2006">
-        <mc:Choice xmlns:a14="http://schemas.microsoft.com/office/drawing/2010/main" Requires="a14">
+      <mc:AlternateContent xmlns:mc="http://schemas.openxmlformats.org/markup-compatibility/2006" xmlns:a14="http://schemas.microsoft.com/office/drawing/2010/main">
+        <mc:Choice Requires="a14">
           <p:sp>
             <p:nvSpPr>
               <p:cNvPr id="2" name="Title 1">
@@ -7200,7 +7200,7 @@
             </p:txBody>
           </p:sp>
         </mc:Choice>
-        <mc:Fallback>
+        <mc:Fallback xmlns="">
           <p:sp>
             <p:nvSpPr>
               <p:cNvPr id="2" name="Title 1">
@@ -7545,8 +7545,8 @@
           <a:chExt cx="0" cy="0"/>
         </a:xfrm>
       </p:grpSpPr>
-      <mc:AlternateContent xmlns:mc="http://schemas.openxmlformats.org/markup-compatibility/2006">
-        <mc:Choice xmlns:a14="http://schemas.microsoft.com/office/drawing/2010/main" Requires="a14">
+      <mc:AlternateContent xmlns:mc="http://schemas.openxmlformats.org/markup-compatibility/2006" xmlns:a14="http://schemas.microsoft.com/office/drawing/2010/main">
+        <mc:Choice Requires="a14">
           <p:sp>
             <p:nvSpPr>
               <p:cNvPr id="2" name="Title 1">
@@ -7654,7 +7654,7 @@
             </p:txBody>
           </p:sp>
         </mc:Choice>
-        <mc:Fallback>
+        <mc:Fallback xmlns="">
           <p:sp>
             <p:nvSpPr>
               <p:cNvPr id="2" name="Title 1">
@@ -8040,8 +8040,8 @@
           <a:chExt cx="0" cy="0"/>
         </a:xfrm>
       </p:grpSpPr>
-      <mc:AlternateContent xmlns:mc="http://schemas.openxmlformats.org/markup-compatibility/2006">
-        <mc:Choice xmlns:a14="http://schemas.microsoft.com/office/drawing/2010/main" Requires="a14">
+      <mc:AlternateContent xmlns:mc="http://schemas.openxmlformats.org/markup-compatibility/2006" xmlns:a14="http://schemas.microsoft.com/office/drawing/2010/main">
+        <mc:Choice Requires="a14">
           <p:sp>
             <p:nvSpPr>
               <p:cNvPr id="2" name="Title 1">
@@ -8157,7 +8157,7 @@
             </p:txBody>
           </p:sp>
         </mc:Choice>
-        <mc:Fallback>
+        <mc:Fallback xmlns="">
           <p:sp>
             <p:nvSpPr>
               <p:cNvPr id="2" name="Title 1">
@@ -8319,8 +8319,8 @@
           <a:chExt cx="0" cy="0"/>
         </a:xfrm>
       </p:grpSpPr>
-      <mc:AlternateContent xmlns:mc="http://schemas.openxmlformats.org/markup-compatibility/2006">
-        <mc:Choice xmlns:a14="http://schemas.microsoft.com/office/drawing/2010/main" Requires="a14">
+      <mc:AlternateContent xmlns:mc="http://schemas.openxmlformats.org/markup-compatibility/2006" xmlns:a14="http://schemas.microsoft.com/office/drawing/2010/main">
+        <mc:Choice Requires="a14">
           <p:sp>
             <p:nvSpPr>
               <p:cNvPr id="2" name="Title 1">
@@ -8428,7 +8428,7 @@
             </p:txBody>
           </p:sp>
         </mc:Choice>
-        <mc:Fallback>
+        <mc:Fallback xmlns="">
           <p:sp>
             <p:nvSpPr>
               <p:cNvPr id="2" name="Title 1">
@@ -9521,8 +9521,8 @@
           <a:chExt cx="0" cy="0"/>
         </a:xfrm>
       </p:grpSpPr>
-      <mc:AlternateContent xmlns:mc="http://schemas.openxmlformats.org/markup-compatibility/2006">
-        <mc:Choice xmlns:a14="http://schemas.microsoft.com/office/drawing/2010/main" Requires="a14">
+      <mc:AlternateContent xmlns:mc="http://schemas.openxmlformats.org/markup-compatibility/2006" xmlns:a14="http://schemas.microsoft.com/office/drawing/2010/main">
+        <mc:Choice Requires="a14">
           <p:sp>
             <p:nvSpPr>
               <p:cNvPr id="2" name="Title 1">
@@ -9630,7 +9630,7 @@
             </p:txBody>
           </p:sp>
         </mc:Choice>
-        <mc:Fallback>
+        <mc:Fallback xmlns="">
           <p:sp>
             <p:nvSpPr>
               <p:cNvPr id="2" name="Title 1">
@@ -9836,8 +9836,8 @@
           <a:chExt cx="0" cy="0"/>
         </a:xfrm>
       </p:grpSpPr>
-      <mc:AlternateContent xmlns:mc="http://schemas.openxmlformats.org/markup-compatibility/2006">
-        <mc:Choice xmlns:a14="http://schemas.microsoft.com/office/drawing/2010/main" Requires="a14">
+      <mc:AlternateContent xmlns:mc="http://schemas.openxmlformats.org/markup-compatibility/2006" xmlns:a14="http://schemas.microsoft.com/office/drawing/2010/main">
+        <mc:Choice Requires="a14">
           <p:sp>
             <p:nvSpPr>
               <p:cNvPr id="2" name="Title 1">
@@ -9953,7 +9953,7 @@
             </p:txBody>
           </p:sp>
         </mc:Choice>
-        <mc:Fallback>
+        <mc:Fallback xmlns="">
           <p:sp>
             <p:nvSpPr>
               <p:cNvPr id="2" name="Title 1">
@@ -13482,7 +13482,7 @@
                   <a:srgbClr val="7030A0"/>
                 </a:solidFill>
               </a:rPr>
-              <a:t>Slide Switch Value and Frequency pf Waveform</a:t>
+              <a:t>Slide Switch Value and Frequency of Waveform</a:t>
             </a:r>
           </a:p>
         </p:txBody>

</xml_diff>